<commit_message>
changes on the Presentation
</commit_message>
<xml_diff>
--- a/docs/final-delivery/final_demonstration.pptx
+++ b/docs/final-delivery/final_demonstration.pptx
@@ -230,7 +230,7 @@
           <a:p>
             <a:fld id="{AE2878C6-71D8-4CCA-BAA2-BDA9B09C4693}" type="datetimeFigureOut">
               <a:rPr lang="pt-PT" smtClean="0"/>
-              <a:t>20/07/2022</a:t>
+              <a:t>21/07/2022</a:t>
             </a:fld>
             <a:endParaRPr lang="pt-PT"/>
           </a:p>
@@ -1652,7 +1652,7 @@
           <a:p>
             <a:fld id="{71E8F39A-2FD0-4B84-8CE2-B235B2217E9A}" type="datetime1">
               <a:rPr lang="pt-PT" smtClean="0"/>
-              <a:t>20/07/2022</a:t>
+              <a:t>21/07/2022</a:t>
             </a:fld>
             <a:endParaRPr lang="pt-PT"/>
           </a:p>
@@ -1850,7 +1850,7 @@
           <a:p>
             <a:fld id="{476DE7D9-5358-409F-B54B-B36C5B5CAEAE}" type="datetime1">
               <a:rPr lang="pt-PT" smtClean="0"/>
-              <a:t>20/07/2022</a:t>
+              <a:t>21/07/2022</a:t>
             </a:fld>
             <a:endParaRPr lang="pt-PT"/>
           </a:p>
@@ -2058,7 +2058,7 @@
           <a:p>
             <a:fld id="{81C46145-D87A-4E31-8E4A-B7DA916B4134}" type="datetime1">
               <a:rPr lang="pt-PT" smtClean="0"/>
-              <a:t>20/07/2022</a:t>
+              <a:t>21/07/2022</a:t>
             </a:fld>
             <a:endParaRPr lang="pt-PT"/>
           </a:p>
@@ -2256,7 +2256,7 @@
           <a:p>
             <a:fld id="{B0762F41-A4A9-4B81-B0FE-157A422CC113}" type="datetime1">
               <a:rPr lang="pt-PT" smtClean="0"/>
-              <a:t>20/07/2022</a:t>
+              <a:t>21/07/2022</a:t>
             </a:fld>
             <a:endParaRPr lang="pt-PT"/>
           </a:p>
@@ -2531,7 +2531,7 @@
           <a:p>
             <a:fld id="{8A6FE2CF-506A-44EE-9CDB-9CA32A0EA254}" type="datetime1">
               <a:rPr lang="pt-PT" smtClean="0"/>
-              <a:t>20/07/2022</a:t>
+              <a:t>21/07/2022</a:t>
             </a:fld>
             <a:endParaRPr lang="pt-PT"/>
           </a:p>
@@ -2796,7 +2796,7 @@
           <a:p>
             <a:fld id="{4D093144-108E-4ABB-B5EE-989550599024}" type="datetime1">
               <a:rPr lang="pt-PT" smtClean="0"/>
-              <a:t>20/07/2022</a:t>
+              <a:t>21/07/2022</a:t>
             </a:fld>
             <a:endParaRPr lang="pt-PT"/>
           </a:p>
@@ -3208,7 +3208,7 @@
           <a:p>
             <a:fld id="{71037909-39AA-4969-A8DE-541654EC4B3C}" type="datetime1">
               <a:rPr lang="pt-PT" smtClean="0"/>
-              <a:t>20/07/2022</a:t>
+              <a:t>21/07/2022</a:t>
             </a:fld>
             <a:endParaRPr lang="pt-PT"/>
           </a:p>
@@ -3349,7 +3349,7 @@
           <a:p>
             <a:fld id="{2925BD8D-BF4A-433C-8BD2-12F51FF2706D}" type="datetime1">
               <a:rPr lang="pt-PT" smtClean="0"/>
-              <a:t>20/07/2022</a:t>
+              <a:t>21/07/2022</a:t>
             </a:fld>
             <a:endParaRPr lang="pt-PT"/>
           </a:p>
@@ -3462,7 +3462,7 @@
           <a:p>
             <a:fld id="{8154E443-2AAA-469F-ABFA-1C5467D579D4}" type="datetime1">
               <a:rPr lang="pt-PT" smtClean="0"/>
-              <a:t>20/07/2022</a:t>
+              <a:t>21/07/2022</a:t>
             </a:fld>
             <a:endParaRPr lang="pt-PT"/>
           </a:p>
@@ -3773,7 +3773,7 @@
           <a:p>
             <a:fld id="{530DAAB8-059A-4AA6-9B4B-B3069E6F3839}" type="datetime1">
               <a:rPr lang="pt-PT" smtClean="0"/>
-              <a:t>20/07/2022</a:t>
+              <a:t>21/07/2022</a:t>
             </a:fld>
             <a:endParaRPr lang="pt-PT"/>
           </a:p>
@@ -4061,7 +4061,7 @@
           <a:p>
             <a:fld id="{5E0E70E8-D5C9-4440-8F9C-97207B2B1563}" type="datetime1">
               <a:rPr lang="pt-PT" smtClean="0"/>
-              <a:t>20/07/2022</a:t>
+              <a:t>21/07/2022</a:t>
             </a:fld>
             <a:endParaRPr lang="pt-PT"/>
           </a:p>
@@ -4302,7 +4302,7 @@
           <a:p>
             <a:fld id="{DC24F65C-C974-4992-BD7A-F0053110CB9D}" type="datetime1">
               <a:rPr lang="pt-PT" smtClean="0"/>
-              <a:t>20/07/2022</a:t>
+              <a:t>21/07/2022</a:t>
             </a:fld>
             <a:endParaRPr lang="pt-PT"/>
           </a:p>
@@ -15855,7 +15855,7 @@
                 <a:latin typeface="Arial" panose="020B0604020202020204" pitchFamily="34" charset="0"/>
                 <a:cs typeface="Arial" panose="020B0604020202020204" pitchFamily="34" charset="0"/>
               </a:rPr>
-              <a:t>Existem 3 tipos de papéis no clube:</a:t>
+              <a:t>Existem 3 tipos de papéis na aplicação:</a:t>
             </a:r>
           </a:p>
           <a:p>
@@ -17068,7 +17068,7 @@
                 <a:latin typeface="Arial" panose="020B0604020202020204" pitchFamily="34" charset="0"/>
                 <a:cs typeface="Arial" panose="020B0604020202020204" pitchFamily="34" charset="0"/>
               </a:rPr>
-              <a:t>Criação de um cartão de membro digital</a:t>
+              <a:t>Cartão de membro digital</a:t>
             </a:r>
           </a:p>
           <a:p>
@@ -21990,41 +21990,12 @@
           </a:p>
         </p:txBody>
       </p:sp>
-      <p:sp>
-        <p:nvSpPr>
-          <p:cNvPr id="2" name="Slide Number Placeholder 1">
+      <p:pic>
+        <p:nvPicPr>
+          <p:cNvPr id="15" name="Imagem 14">
             <a:extLst>
               <a:ext uri="{FF2B5EF4-FFF2-40B4-BE49-F238E27FC236}">
-                <a16:creationId xmlns:a16="http://schemas.microsoft.com/office/drawing/2014/main" id="{D389E60E-9E7C-C9AA-30AA-07BBED64EDF4}"/>
-              </a:ext>
-            </a:extLst>
-          </p:cNvPr>
-          <p:cNvSpPr>
-            <a:spLocks noGrp="1"/>
-          </p:cNvSpPr>
-          <p:nvPr>
-            <p:ph type="sldNum" sz="quarter" idx="12"/>
-          </p:nvPr>
-        </p:nvSpPr>
-        <p:spPr/>
-        <p:txBody>
-          <a:bodyPr/>
-          <a:lstStyle/>
-          <a:p>
-            <a:fld id="{834E4636-1AC7-4593-8425-9A7E3B693646}" type="slidenum">
-              <a:rPr lang="pt-PT" smtClean="0"/>
-              <a:t>9</a:t>
-            </a:fld>
-            <a:endParaRPr lang="pt-PT"/>
-          </a:p>
-        </p:txBody>
-      </p:sp>
-      <p:pic>
-        <p:nvPicPr>
-          <p:cNvPr id="4" name="Picture 3" descr="Diagram&#10;&#10;Description automatically generated">
-            <a:extLst>
-              <a:ext uri="{FF2B5EF4-FFF2-40B4-BE49-F238E27FC236}">
-                <a16:creationId xmlns:a16="http://schemas.microsoft.com/office/drawing/2014/main" id="{E1EB7894-8A3D-ADBA-0B72-36D806080BBE}"/>
+                <a16:creationId xmlns:a16="http://schemas.microsoft.com/office/drawing/2014/main" id="{5E3DE74F-5B2C-64F3-CCF2-D67C560CA1D6}"/>
               </a:ext>
             </a:extLst>
           </p:cNvPr>
@@ -22047,14 +22018,43 @@
         </p:blipFill>
         <p:spPr>
           <a:xfrm>
-            <a:off x="1121982" y="1573660"/>
-            <a:ext cx="9635787" cy="3710676"/>
+            <a:off x="1697174" y="1400513"/>
+            <a:ext cx="8797651" cy="4358877"/>
           </a:xfrm>
           <a:prstGeom prst="rect">
             <a:avLst/>
           </a:prstGeom>
         </p:spPr>
       </p:pic>
+      <p:sp>
+        <p:nvSpPr>
+          <p:cNvPr id="2" name="Slide Number Placeholder 1">
+            <a:extLst>
+              <a:ext uri="{FF2B5EF4-FFF2-40B4-BE49-F238E27FC236}">
+                <a16:creationId xmlns:a16="http://schemas.microsoft.com/office/drawing/2014/main" id="{D389E60E-9E7C-C9AA-30AA-07BBED64EDF4}"/>
+              </a:ext>
+            </a:extLst>
+          </p:cNvPr>
+          <p:cNvSpPr>
+            <a:spLocks noGrp="1"/>
+          </p:cNvSpPr>
+          <p:nvPr>
+            <p:ph type="sldNum" sz="quarter" idx="12"/>
+          </p:nvPr>
+        </p:nvSpPr>
+        <p:spPr/>
+        <p:txBody>
+          <a:bodyPr/>
+          <a:lstStyle/>
+          <a:p>
+            <a:fld id="{834E4636-1AC7-4593-8425-9A7E3B693646}" type="slidenum">
+              <a:rPr lang="pt-PT" smtClean="0"/>
+              <a:t>9</a:t>
+            </a:fld>
+            <a:endParaRPr lang="pt-PT"/>
+          </a:p>
+        </p:txBody>
+      </p:sp>
     </p:spTree>
     <p:extLst>
       <p:ext uri="{BB962C8B-B14F-4D97-AF65-F5344CB8AC3E}">

</xml_diff>

<commit_message>
modified final report & presentation
</commit_message>
<xml_diff>
--- a/docs/final-delivery/final_demonstration.pptx
+++ b/docs/final-delivery/final_demonstration.pptx
@@ -230,7 +230,7 @@
           <a:p>
             <a:fld id="{AE2878C6-71D8-4CCA-BAA2-BDA9B09C4693}" type="datetimeFigureOut">
               <a:rPr lang="pt-PT" smtClean="0"/>
-              <a:t>21/07/2022</a:t>
+              <a:t>26/07/2022</a:t>
             </a:fld>
             <a:endParaRPr lang="pt-PT"/>
           </a:p>
@@ -388,7 +388,7 @@
           <a:p>
             <a:fld id="{94CA1B7B-AC94-4A5F-A3AF-BA18A1FB115E}" type="slidenum">
               <a:rPr lang="pt-PT" smtClean="0"/>
-              <a:t>‹#›</a:t>
+              <a:t>‹nº›</a:t>
             </a:fld>
             <a:endParaRPr lang="pt-PT"/>
           </a:p>
@@ -1652,7 +1652,7 @@
           <a:p>
             <a:fld id="{71E8F39A-2FD0-4B84-8CE2-B235B2217E9A}" type="datetime1">
               <a:rPr lang="pt-PT" smtClean="0"/>
-              <a:t>21/07/2022</a:t>
+              <a:t>26/07/2022</a:t>
             </a:fld>
             <a:endParaRPr lang="pt-PT"/>
           </a:p>
@@ -1706,7 +1706,7 @@
           <a:p>
             <a:fld id="{834E4636-1AC7-4593-8425-9A7E3B693646}" type="slidenum">
               <a:rPr lang="pt-PT" smtClean="0"/>
-              <a:t>‹#›</a:t>
+              <a:t>‹nº›</a:t>
             </a:fld>
             <a:endParaRPr lang="pt-PT"/>
           </a:p>
@@ -1850,7 +1850,7 @@
           <a:p>
             <a:fld id="{476DE7D9-5358-409F-B54B-B36C5B5CAEAE}" type="datetime1">
               <a:rPr lang="pt-PT" smtClean="0"/>
-              <a:t>21/07/2022</a:t>
+              <a:t>26/07/2022</a:t>
             </a:fld>
             <a:endParaRPr lang="pt-PT"/>
           </a:p>
@@ -1904,7 +1904,7 @@
           <a:p>
             <a:fld id="{834E4636-1AC7-4593-8425-9A7E3B693646}" type="slidenum">
               <a:rPr lang="pt-PT" smtClean="0"/>
-              <a:t>‹#›</a:t>
+              <a:t>‹nº›</a:t>
             </a:fld>
             <a:endParaRPr lang="pt-PT"/>
           </a:p>
@@ -2058,7 +2058,7 @@
           <a:p>
             <a:fld id="{81C46145-D87A-4E31-8E4A-B7DA916B4134}" type="datetime1">
               <a:rPr lang="pt-PT" smtClean="0"/>
-              <a:t>21/07/2022</a:t>
+              <a:t>26/07/2022</a:t>
             </a:fld>
             <a:endParaRPr lang="pt-PT"/>
           </a:p>
@@ -2112,7 +2112,7 @@
           <a:p>
             <a:fld id="{834E4636-1AC7-4593-8425-9A7E3B693646}" type="slidenum">
               <a:rPr lang="pt-PT" smtClean="0"/>
-              <a:t>‹#›</a:t>
+              <a:t>‹nº›</a:t>
             </a:fld>
             <a:endParaRPr lang="pt-PT"/>
           </a:p>
@@ -2256,7 +2256,7 @@
           <a:p>
             <a:fld id="{B0762F41-A4A9-4B81-B0FE-157A422CC113}" type="datetime1">
               <a:rPr lang="pt-PT" smtClean="0"/>
-              <a:t>21/07/2022</a:t>
+              <a:t>26/07/2022</a:t>
             </a:fld>
             <a:endParaRPr lang="pt-PT"/>
           </a:p>
@@ -2310,7 +2310,7 @@
           <a:p>
             <a:fld id="{834E4636-1AC7-4593-8425-9A7E3B693646}" type="slidenum">
               <a:rPr lang="pt-PT" smtClean="0"/>
-              <a:t>‹#›</a:t>
+              <a:t>‹nº›</a:t>
             </a:fld>
             <a:endParaRPr lang="pt-PT"/>
           </a:p>
@@ -2531,7 +2531,7 @@
           <a:p>
             <a:fld id="{8A6FE2CF-506A-44EE-9CDB-9CA32A0EA254}" type="datetime1">
               <a:rPr lang="pt-PT" smtClean="0"/>
-              <a:t>21/07/2022</a:t>
+              <a:t>26/07/2022</a:t>
             </a:fld>
             <a:endParaRPr lang="pt-PT"/>
           </a:p>
@@ -2585,7 +2585,7 @@
           <a:p>
             <a:fld id="{834E4636-1AC7-4593-8425-9A7E3B693646}" type="slidenum">
               <a:rPr lang="pt-PT" smtClean="0"/>
-              <a:t>‹#›</a:t>
+              <a:t>‹nº›</a:t>
             </a:fld>
             <a:endParaRPr lang="pt-PT"/>
           </a:p>
@@ -2796,7 +2796,7 @@
           <a:p>
             <a:fld id="{4D093144-108E-4ABB-B5EE-989550599024}" type="datetime1">
               <a:rPr lang="pt-PT" smtClean="0"/>
-              <a:t>21/07/2022</a:t>
+              <a:t>26/07/2022</a:t>
             </a:fld>
             <a:endParaRPr lang="pt-PT"/>
           </a:p>
@@ -2850,7 +2850,7 @@
           <a:p>
             <a:fld id="{834E4636-1AC7-4593-8425-9A7E3B693646}" type="slidenum">
               <a:rPr lang="pt-PT" smtClean="0"/>
-              <a:t>‹#›</a:t>
+              <a:t>‹nº›</a:t>
             </a:fld>
             <a:endParaRPr lang="pt-PT"/>
           </a:p>
@@ -3208,7 +3208,7 @@
           <a:p>
             <a:fld id="{71037909-39AA-4969-A8DE-541654EC4B3C}" type="datetime1">
               <a:rPr lang="pt-PT" smtClean="0"/>
-              <a:t>21/07/2022</a:t>
+              <a:t>26/07/2022</a:t>
             </a:fld>
             <a:endParaRPr lang="pt-PT"/>
           </a:p>
@@ -3262,7 +3262,7 @@
           <a:p>
             <a:fld id="{834E4636-1AC7-4593-8425-9A7E3B693646}" type="slidenum">
               <a:rPr lang="pt-PT" smtClean="0"/>
-              <a:t>‹#›</a:t>
+              <a:t>‹nº›</a:t>
             </a:fld>
             <a:endParaRPr lang="pt-PT"/>
           </a:p>
@@ -3349,7 +3349,7 @@
           <a:p>
             <a:fld id="{2925BD8D-BF4A-433C-8BD2-12F51FF2706D}" type="datetime1">
               <a:rPr lang="pt-PT" smtClean="0"/>
-              <a:t>21/07/2022</a:t>
+              <a:t>26/07/2022</a:t>
             </a:fld>
             <a:endParaRPr lang="pt-PT"/>
           </a:p>
@@ -3403,7 +3403,7 @@
           <a:p>
             <a:fld id="{834E4636-1AC7-4593-8425-9A7E3B693646}" type="slidenum">
               <a:rPr lang="pt-PT" smtClean="0"/>
-              <a:t>‹#›</a:t>
+              <a:t>‹nº›</a:t>
             </a:fld>
             <a:endParaRPr lang="pt-PT"/>
           </a:p>
@@ -3462,7 +3462,7 @@
           <a:p>
             <a:fld id="{8154E443-2AAA-469F-ABFA-1C5467D579D4}" type="datetime1">
               <a:rPr lang="pt-PT" smtClean="0"/>
-              <a:t>21/07/2022</a:t>
+              <a:t>26/07/2022</a:t>
             </a:fld>
             <a:endParaRPr lang="pt-PT"/>
           </a:p>
@@ -3516,7 +3516,7 @@
           <a:p>
             <a:fld id="{834E4636-1AC7-4593-8425-9A7E3B693646}" type="slidenum">
               <a:rPr lang="pt-PT" smtClean="0"/>
-              <a:t>‹#›</a:t>
+              <a:t>‹nº›</a:t>
             </a:fld>
             <a:endParaRPr lang="pt-PT"/>
           </a:p>
@@ -3773,7 +3773,7 @@
           <a:p>
             <a:fld id="{530DAAB8-059A-4AA6-9B4B-B3069E6F3839}" type="datetime1">
               <a:rPr lang="pt-PT" smtClean="0"/>
-              <a:t>21/07/2022</a:t>
+              <a:t>26/07/2022</a:t>
             </a:fld>
             <a:endParaRPr lang="pt-PT"/>
           </a:p>
@@ -3827,7 +3827,7 @@
           <a:p>
             <a:fld id="{834E4636-1AC7-4593-8425-9A7E3B693646}" type="slidenum">
               <a:rPr lang="pt-PT" smtClean="0"/>
-              <a:t>‹#›</a:t>
+              <a:t>‹nº›</a:t>
             </a:fld>
             <a:endParaRPr lang="pt-PT"/>
           </a:p>
@@ -4061,7 +4061,7 @@
           <a:p>
             <a:fld id="{5E0E70E8-D5C9-4440-8F9C-97207B2B1563}" type="datetime1">
               <a:rPr lang="pt-PT" smtClean="0"/>
-              <a:t>21/07/2022</a:t>
+              <a:t>26/07/2022</a:t>
             </a:fld>
             <a:endParaRPr lang="pt-PT"/>
           </a:p>
@@ -4115,7 +4115,7 @@
           <a:p>
             <a:fld id="{834E4636-1AC7-4593-8425-9A7E3B693646}" type="slidenum">
               <a:rPr lang="pt-PT" smtClean="0"/>
-              <a:t>‹#›</a:t>
+              <a:t>‹nº›</a:t>
             </a:fld>
             <a:endParaRPr lang="pt-PT"/>
           </a:p>
@@ -4302,7 +4302,7 @@
           <a:p>
             <a:fld id="{DC24F65C-C974-4992-BD7A-F0053110CB9D}" type="datetime1">
               <a:rPr lang="pt-PT" smtClean="0"/>
-              <a:t>21/07/2022</a:t>
+              <a:t>26/07/2022</a:t>
             </a:fld>
             <a:endParaRPr lang="pt-PT"/>
           </a:p>
@@ -4392,7 +4392,7 @@
           <a:p>
             <a:fld id="{834E4636-1AC7-4593-8425-9A7E3B693646}" type="slidenum">
               <a:rPr lang="pt-PT" smtClean="0"/>
-              <a:t>‹#›</a:t>
+              <a:t>‹nº›</a:t>
             </a:fld>
             <a:endParaRPr lang="pt-PT"/>
           </a:p>
@@ -12333,10 +12333,30 @@
               <a:buFont typeface="Tahoma" panose="020B0604030504040204" pitchFamily="34" charset="0"/>
               <a:buChar char="●"/>
             </a:pPr>
-            <a:endParaRPr lang="pt-PT" dirty="0">
-              <a:latin typeface="Arial" panose="020B0604020202020204" pitchFamily="34" charset="0"/>
-              <a:cs typeface="Arial" panose="020B0604020202020204" pitchFamily="34" charset="0"/>
-            </a:endParaRPr>
+            <a:r>
+              <a:rPr lang="pt-PT" dirty="0">
+                <a:latin typeface="Arial" panose="020B0604020202020204" pitchFamily="34" charset="0"/>
+                <a:cs typeface="Arial" panose="020B0604020202020204" pitchFamily="34" charset="0"/>
+              </a:rPr>
+              <a:t>Possibilitar que a criação de quotas não tenha mão humana e seja uma tarefa automatizada</a:t>
+            </a:r>
+          </a:p>
+          <a:p>
+            <a:pPr marL="342900" indent="-342900" algn="l">
+              <a:lnSpc>
+                <a:spcPct val="100000"/>
+              </a:lnSpc>
+              <a:buSzPct val="100000"/>
+              <a:buFont typeface="Tahoma" panose="020B0604030504040204" pitchFamily="34" charset="0"/>
+              <a:buChar char="●"/>
+            </a:pPr>
+            <a:r>
+              <a:rPr lang="pt-PT" dirty="0">
+                <a:latin typeface="Arial" panose="020B0604020202020204" pitchFamily="34" charset="0"/>
+                <a:cs typeface="Arial" panose="020B0604020202020204" pitchFamily="34" charset="0"/>
+              </a:rPr>
+              <a:t>Dar a opção de colocar anexos ao enviar emails</a:t>
+            </a:r>
           </a:p>
         </p:txBody>
       </p:sp>
@@ -15855,7 +15875,21 @@
                 <a:latin typeface="Arial" panose="020B0604020202020204" pitchFamily="34" charset="0"/>
                 <a:cs typeface="Arial" panose="020B0604020202020204" pitchFamily="34" charset="0"/>
               </a:rPr>
-              <a:t>Existem 3 tipos de papéis na aplicação:</a:t>
+              <a:t>Existem 3 tipos de </a:t>
+            </a:r>
+            <a:r>
+              <a:rPr lang="pt-PT" sz="2000" i="1" dirty="0">
+                <a:latin typeface="Arial" panose="020B0604020202020204" pitchFamily="34" charset="0"/>
+                <a:cs typeface="Arial" panose="020B0604020202020204" pitchFamily="34" charset="0"/>
+              </a:rPr>
+              <a:t>roles</a:t>
+            </a:r>
+            <a:r>
+              <a:rPr lang="pt-PT" sz="2000" dirty="0">
+                <a:latin typeface="Arial" panose="020B0604020202020204" pitchFamily="34" charset="0"/>
+                <a:cs typeface="Arial" panose="020B0604020202020204" pitchFamily="34" charset="0"/>
+              </a:rPr>
+              <a:t> na aplicação:</a:t>
             </a:r>
           </a:p>
           <a:p>
@@ -16248,21 +16282,14 @@
               <a:defRPr/>
             </a:pPr>
             <a:r>
-              <a:rPr kumimoji="0" lang="en-US" sz="5000" b="1" i="0" u="none" strike="noStrike" kern="0" cap="none" spc="0" normalizeH="0" baseline="0" noProof="0" dirty="0" err="1">
-                <a:ln>
-                  <a:noFill/>
-                </a:ln>
+              <a:rPr lang="en-US" b="1" i="1" kern="0" dirty="0">
                 <a:solidFill>
                   <a:srgbClr val="3D4D55"/>
                 </a:solidFill>
-                <a:effectLst/>
-                <a:uLnTx/>
-                <a:uFillTx/>
                 <a:latin typeface="Arial" panose="020B0604020202020204" pitchFamily="34" charset="0"/>
                 <a:cs typeface="Arial" panose="020B0604020202020204" pitchFamily="34" charset="0"/>
-                <a:sym typeface="Commissioner ExtraBold"/>
               </a:rPr>
-              <a:t>Papéis</a:t>
+              <a:t>Roles</a:t>
             </a:r>
             <a:r>
               <a:rPr kumimoji="0" lang="en-US" sz="5000" b="1" i="0" u="none" strike="noStrike" kern="0" cap="none" spc="0" normalizeH="0" baseline="0" noProof="0" dirty="0">
@@ -21128,6 +21155,42 @@
           <a:chExt cx="0" cy="0"/>
         </a:xfrm>
       </p:grpSpPr>
+      <p:pic>
+        <p:nvPicPr>
+          <p:cNvPr id="5" name="Imagem 4">
+            <a:extLst>
+              <a:ext uri="{FF2B5EF4-FFF2-40B4-BE49-F238E27FC236}">
+                <a16:creationId xmlns:a16="http://schemas.microsoft.com/office/drawing/2014/main" id="{49A0BB3D-A6F3-00F9-66E8-358304041A11}"/>
+              </a:ext>
+            </a:extLst>
+          </p:cNvPr>
+          <p:cNvPicPr>
+            <a:picLocks noChangeAspect="1"/>
+          </p:cNvPicPr>
+          <p:nvPr/>
+        </p:nvPicPr>
+        <p:blipFill>
+          <a:blip r:embed="rId3">
+            <a:extLst>
+              <a:ext uri="{28A0092B-C50C-407E-A947-70E740481C1C}">
+                <a14:useLocalDpi xmlns:a14="http://schemas.microsoft.com/office/drawing/2010/main" val="0"/>
+              </a:ext>
+            </a:extLst>
+          </a:blip>
+          <a:stretch>
+            <a:fillRect/>
+          </a:stretch>
+        </p:blipFill>
+        <p:spPr>
+          <a:xfrm>
+            <a:off x="1469558" y="1689135"/>
+            <a:ext cx="9179859" cy="3479730"/>
+          </a:xfrm>
+          <a:prstGeom prst="rect">
+            <a:avLst/>
+          </a:prstGeom>
+        </p:spPr>
+      </p:pic>
       <p:sp>
         <p:nvSpPr>
           <p:cNvPr id="10" name="Google Shape;1463;p74">
@@ -22019,42 +22082,6 @@
           </a:p>
         </p:txBody>
       </p:sp>
-      <p:pic>
-        <p:nvPicPr>
-          <p:cNvPr id="4" name="Picture 3" descr="Diagram&#10;&#10;Description automatically generated">
-            <a:extLst>
-              <a:ext uri="{FF2B5EF4-FFF2-40B4-BE49-F238E27FC236}">
-                <a16:creationId xmlns:a16="http://schemas.microsoft.com/office/drawing/2014/main" id="{1650EB4D-4885-2FCF-63EC-E4F3EEFA2407}"/>
-              </a:ext>
-            </a:extLst>
-          </p:cNvPr>
-          <p:cNvPicPr>
-            <a:picLocks noChangeAspect="1"/>
-          </p:cNvPicPr>
-          <p:nvPr/>
-        </p:nvPicPr>
-        <p:blipFill>
-          <a:blip r:embed="rId3">
-            <a:extLst>
-              <a:ext uri="{28A0092B-C50C-407E-A947-70E740481C1C}">
-                <a14:useLocalDpi xmlns:a14="http://schemas.microsoft.com/office/drawing/2010/main" val="0"/>
-              </a:ext>
-            </a:extLst>
-          </a:blip>
-          <a:stretch>
-            <a:fillRect/>
-          </a:stretch>
-        </p:blipFill>
-        <p:spPr>
-          <a:xfrm>
-            <a:off x="1173688" y="1533449"/>
-            <a:ext cx="9844624" cy="3791097"/>
-          </a:xfrm>
-          <a:prstGeom prst="rect">
-            <a:avLst/>
-          </a:prstGeom>
-        </p:spPr>
-      </p:pic>
     </p:spTree>
     <p:extLst>
       <p:ext uri="{BB962C8B-B14F-4D97-AF65-F5344CB8AC3E}">

</xml_diff>